<commit_message>
Added carrito de compras' html
</commit_message>
<xml_diff>
--- a/layoutMenú.pptx
+++ b/layoutMenú.pptx
@@ -498,7 +498,7 @@
           <a:p>
             <a:fld id="{EA9FD3F8-DA2D-47F6-956C-7F3E6CDCAEE5}" type="datetimeFigureOut">
               <a:rPr lang="es-CO" smtClean="0"/>
-              <a:t>18/08/2024</a:t>
+              <a:t>20/08/2024</a:t>
             </a:fld>
             <a:endParaRPr lang="es-CO"/>
           </a:p>
@@ -698,7 +698,7 @@
           <a:p>
             <a:fld id="{EA9FD3F8-DA2D-47F6-956C-7F3E6CDCAEE5}" type="datetimeFigureOut">
               <a:rPr lang="es-CO" smtClean="0"/>
-              <a:t>18/08/2024</a:t>
+              <a:t>20/08/2024</a:t>
             </a:fld>
             <a:endParaRPr lang="es-CO"/>
           </a:p>
@@ -908,7 +908,7 @@
           <a:p>
             <a:fld id="{EA9FD3F8-DA2D-47F6-956C-7F3E6CDCAEE5}" type="datetimeFigureOut">
               <a:rPr lang="es-CO" smtClean="0"/>
-              <a:t>18/08/2024</a:t>
+              <a:t>20/08/2024</a:t>
             </a:fld>
             <a:endParaRPr lang="es-CO"/>
           </a:p>
@@ -1108,7 +1108,7 @@
           <a:p>
             <a:fld id="{EA9FD3F8-DA2D-47F6-956C-7F3E6CDCAEE5}" type="datetimeFigureOut">
               <a:rPr lang="es-CO" smtClean="0"/>
-              <a:t>18/08/2024</a:t>
+              <a:t>20/08/2024</a:t>
             </a:fld>
             <a:endParaRPr lang="es-CO"/>
           </a:p>
@@ -1384,7 +1384,7 @@
           <a:p>
             <a:fld id="{EA9FD3F8-DA2D-47F6-956C-7F3E6CDCAEE5}" type="datetimeFigureOut">
               <a:rPr lang="es-CO" smtClean="0"/>
-              <a:t>18/08/2024</a:t>
+              <a:t>20/08/2024</a:t>
             </a:fld>
             <a:endParaRPr lang="es-CO"/>
           </a:p>
@@ -1652,7 +1652,7 @@
           <a:p>
             <a:fld id="{EA9FD3F8-DA2D-47F6-956C-7F3E6CDCAEE5}" type="datetimeFigureOut">
               <a:rPr lang="es-CO" smtClean="0"/>
-              <a:t>18/08/2024</a:t>
+              <a:t>20/08/2024</a:t>
             </a:fld>
             <a:endParaRPr lang="es-CO"/>
           </a:p>
@@ -2067,7 +2067,7 @@
           <a:p>
             <a:fld id="{EA9FD3F8-DA2D-47F6-956C-7F3E6CDCAEE5}" type="datetimeFigureOut">
               <a:rPr lang="es-CO" smtClean="0"/>
-              <a:t>18/08/2024</a:t>
+              <a:t>20/08/2024</a:t>
             </a:fld>
             <a:endParaRPr lang="es-CO"/>
           </a:p>
@@ -2209,7 +2209,7 @@
           <a:p>
             <a:fld id="{EA9FD3F8-DA2D-47F6-956C-7F3E6CDCAEE5}" type="datetimeFigureOut">
               <a:rPr lang="es-CO" smtClean="0"/>
-              <a:t>18/08/2024</a:t>
+              <a:t>20/08/2024</a:t>
             </a:fld>
             <a:endParaRPr lang="es-CO"/>
           </a:p>
@@ -2322,7 +2322,7 @@
           <a:p>
             <a:fld id="{EA9FD3F8-DA2D-47F6-956C-7F3E6CDCAEE5}" type="datetimeFigureOut">
               <a:rPr lang="es-CO" smtClean="0"/>
-              <a:t>18/08/2024</a:t>
+              <a:t>20/08/2024</a:t>
             </a:fld>
             <a:endParaRPr lang="es-CO"/>
           </a:p>
@@ -2635,7 +2635,7 @@
           <a:p>
             <a:fld id="{EA9FD3F8-DA2D-47F6-956C-7F3E6CDCAEE5}" type="datetimeFigureOut">
               <a:rPr lang="es-CO" smtClean="0"/>
-              <a:t>18/08/2024</a:t>
+              <a:t>20/08/2024</a:t>
             </a:fld>
             <a:endParaRPr lang="es-CO"/>
           </a:p>
@@ -2924,7 +2924,7 @@
           <a:p>
             <a:fld id="{EA9FD3F8-DA2D-47F6-956C-7F3E6CDCAEE5}" type="datetimeFigureOut">
               <a:rPr lang="es-CO" smtClean="0"/>
-              <a:t>18/08/2024</a:t>
+              <a:t>20/08/2024</a:t>
             </a:fld>
             <a:endParaRPr lang="es-CO"/>
           </a:p>
@@ -3167,7 +3167,7 @@
           <a:p>
             <a:fld id="{EA9FD3F8-DA2D-47F6-956C-7F3E6CDCAEE5}" type="datetimeFigureOut">
               <a:rPr lang="es-CO" smtClean="0"/>
-              <a:t>18/08/2024</a:t>
+              <a:t>20/08/2024</a:t>
             </a:fld>
             <a:endParaRPr lang="es-CO"/>
           </a:p>

</xml_diff>